<commit_message>
update for hardware thought.
</commit_message>
<xml_diff>
--- a/02Hardware/07Thought/05.DSA.pptx
+++ b/02Hardware/07Thought/05.DSA.pptx
@@ -252,7 +252,7 @@
           <a:p>
             <a:fld id="{E8CF71B8-DF2A-2E41-BE66-2E18A767DA8A}" type="datetimeFigureOut">
               <a:rPr lang="en-US" smtClean="0"/>
-              <a:t>9/6/23</a:t>
+              <a:t>12/12/23</a:t>
             </a:fld>
             <a:endParaRPr lang="en-US"/>
           </a:p>
@@ -429,7 +429,7 @@
           <a:p>
             <a:fld id="{0DD60A27-BF12-6744-9E93-932A0E34D8BB}" type="datetimeFigureOut">
               <a:rPr lang="en-US" smtClean="0"/>
-              <a:t>9/6/23</a:t>
+              <a:t>12/12/23</a:t>
             </a:fld>
             <a:endParaRPr lang="en-US"/>
           </a:p>
@@ -8325,7 +8325,7 @@
                 </a:solidFill>
               </a:rPr>
               <a:pPr/>
-              <a:t>2023/9/6</a:t>
+              <a:t>2023/12/12</a:t>
             </a:fld>
             <a:endParaRPr lang="zh-CN" altLang="en-US" dirty="0">
               <a:solidFill>
@@ -23737,7 +23737,7 @@
         </p:nvSpPr>
         <p:spPr>
           <a:xfrm>
-            <a:off x="1477795" y="3425865"/>
+            <a:off x="1488681" y="4525321"/>
             <a:ext cx="2024146" cy="643926"/>
           </a:xfrm>
           <a:prstGeom prst="rect">
@@ -23797,7 +23797,7 @@
         </p:blipFill>
         <p:spPr>
           <a:xfrm>
-            <a:off x="567817" y="3425865"/>
+            <a:off x="578703" y="4525321"/>
             <a:ext cx="676655" cy="676655"/>
           </a:xfrm>
           <a:prstGeom prst="ellipse">
@@ -23843,8 +23843,8 @@
         </p:nvSpPr>
         <p:spPr>
           <a:xfrm>
-            <a:off x="407157" y="1648004"/>
-            <a:ext cx="11133202" cy="1446550"/>
+            <a:off x="428928" y="1288775"/>
+            <a:ext cx="11133202" cy="2800767"/>
           </a:xfrm>
           <a:prstGeom prst="rect">
             <a:avLst/>
@@ -23862,7 +23862,7 @@
           <a:lstStyle/>
           <a:p>
             <a:r>
-              <a:rPr lang="en-US" altLang="zh-CN" sz="8800" b="1" dirty="0">
+              <a:rPr lang="zh-CN" altLang="en-US" sz="8800" b="1" dirty="0">
                 <a:solidFill>
                   <a:srgbClr val="1D1D1A"/>
                 </a:solidFill>
@@ -23870,18 +23870,7 @@
                 <a:ea typeface="+mj-ea"/>
                 <a:cs typeface="Futura Medium" panose="020B0602020204020303" pitchFamily="34" charset="-79"/>
               </a:rPr>
-              <a:t>SIMD</a:t>
-            </a:r>
-            <a:r>
-              <a:rPr lang="zh-CN" altLang="en-US" sz="8800" b="1" dirty="0">
-                <a:solidFill>
-                  <a:srgbClr val="1D1D1A"/>
-                </a:solidFill>
-                <a:latin typeface="Futura Medium" panose="020B0602020204020303" pitchFamily="34" charset="-79"/>
-                <a:ea typeface="+mj-ea"/>
-                <a:cs typeface="Futura Medium" panose="020B0602020204020303" pitchFamily="34" charset="-79"/>
-              </a:rPr>
-              <a:t>、</a:t>
+              <a:t>在 </a:t>
             </a:r>
             <a:r>
               <a:rPr lang="en-US" altLang="zh-CN" sz="8800" b="1" dirty="0">
@@ -23903,7 +23892,7 @@
                 <a:ea typeface="+mj-ea"/>
                 <a:cs typeface="Futura Medium" panose="020B0602020204020303" pitchFamily="34" charset="-79"/>
               </a:rPr>
-              <a:t>、</a:t>
+              <a:t> 和 </a:t>
             </a:r>
             <a:r>
               <a:rPr lang="en-US" altLang="zh-CN" sz="8800" b="1" dirty="0">
@@ -23916,6 +23905,46 @@
               </a:rPr>
               <a:t>DSA</a:t>
             </a:r>
+            <a:r>
+              <a:rPr lang="zh-CN" altLang="en-US" sz="8800" b="1" dirty="0">
+                <a:solidFill>
+                  <a:srgbClr val="1D1D1A"/>
+                </a:solidFill>
+                <a:latin typeface="Futura Medium" panose="020B0602020204020303" pitchFamily="34" charset="-79"/>
+                <a:ea typeface="+mj-ea"/>
+                <a:cs typeface="Futura Medium" panose="020B0602020204020303" pitchFamily="34" charset="-79"/>
+              </a:rPr>
+              <a:t> 角度 </a:t>
+            </a:r>
+            <a:endParaRPr lang="en-US" altLang="zh-CN" sz="8800" b="1" dirty="0">
+              <a:solidFill>
+                <a:srgbClr val="1D1D1A"/>
+              </a:solidFill>
+              <a:latin typeface="Futura Medium" panose="020B0602020204020303" pitchFamily="34" charset="-79"/>
+              <a:ea typeface="+mj-ea"/>
+              <a:cs typeface="Futura Medium" panose="020B0602020204020303" pitchFamily="34" charset="-79"/>
+            </a:endParaRPr>
+          </a:p>
+          <a:p>
+            <a:r>
+              <a:rPr lang="zh-CN" altLang="en-US" sz="8800" b="1" dirty="0">
+                <a:solidFill>
+                  <a:srgbClr val="1D1D1A"/>
+                </a:solidFill>
+                <a:latin typeface="Futura Medium" panose="020B0602020204020303" pitchFamily="34" charset="-79"/>
+                <a:ea typeface="+mj-ea"/>
+                <a:cs typeface="Futura Medium" panose="020B0602020204020303" pitchFamily="34" charset="-79"/>
+              </a:rPr>
+              <a:t>看英伟达生态</a:t>
+            </a:r>
+            <a:endParaRPr lang="en-US" altLang="zh-CN" sz="8800" b="1" dirty="0">
+              <a:solidFill>
+                <a:srgbClr val="1D1D1A"/>
+              </a:solidFill>
+              <a:latin typeface="Futura Medium" panose="020B0602020204020303" pitchFamily="34" charset="-79"/>
+              <a:ea typeface="+mj-ea"/>
+              <a:cs typeface="Futura Medium" panose="020B0602020204020303" pitchFamily="34" charset="-79"/>
+            </a:endParaRPr>
           </a:p>
         </p:txBody>
       </p:sp>
@@ -29745,8 +29774,12 @@
           <a:lstStyle/>
           <a:p>
             <a:r>
+              <a:rPr lang="en-US" altLang="zh-CN" dirty="0"/>
+              <a:t>1</a:t>
+            </a:r>
+            <a:r>
               <a:rPr lang="zh-CN" altLang="en-US" dirty="0"/>
-              <a:t>概念澄清</a:t>
+              <a:t>、三者概念澄清</a:t>
             </a:r>
           </a:p>
         </p:txBody>
@@ -30565,6 +30598,17 @@
         <p:txBody>
           <a:bodyPr/>
           <a:lstStyle/>
+          <a:p>
+            <a:r>
+              <a:rPr lang="en-US" altLang="zh-CN" dirty="0"/>
+              <a:t>2.</a:t>
+            </a:r>
+            <a:r>
+              <a:rPr lang="zh-CN" altLang="en-US" dirty="0"/>
+              <a:t> 英伟达生态的</a:t>
+            </a:r>
+            <a:endParaRPr lang="en-US" altLang="zh-CN" dirty="0"/>
+          </a:p>
           <a:p>
             <a:r>
               <a:rPr lang="zh-CN" altLang="en-US" dirty="0"/>

</xml_diff>

<commit_message>
update for Hardware 07 thought last.
</commit_message>
<xml_diff>
--- a/02Hardware/07Thought/05.DSA.pptx
+++ b/02Hardware/07Thought/05.DSA.pptx
@@ -252,7 +252,7 @@
           <a:p>
             <a:fld id="{E8CF71B8-DF2A-2E41-BE66-2E18A767DA8A}" type="datetimeFigureOut">
               <a:rPr lang="en-US" smtClean="0"/>
-              <a:t>12/12/23</a:t>
+              <a:t>12/14/23</a:t>
             </a:fld>
             <a:endParaRPr lang="en-US"/>
           </a:p>
@@ -429,7 +429,7 @@
           <a:p>
             <a:fld id="{0DD60A27-BF12-6744-9E93-932A0E34D8BB}" type="datetimeFigureOut">
               <a:rPr lang="en-US" smtClean="0"/>
-              <a:t>12/12/23</a:t>
+              <a:t>12/14/23</a:t>
             </a:fld>
             <a:endParaRPr lang="en-US"/>
           </a:p>
@@ -8325,7 +8325,7 @@
                 </a:solidFill>
               </a:rPr>
               <a:pPr/>
-              <a:t>2023/12/12</a:t>
+              <a:t>2023/12/14</a:t>
             </a:fld>
             <a:endParaRPr lang="zh-CN" altLang="en-US" dirty="0">
               <a:solidFill>
@@ -24427,7 +24427,13 @@
           <p:nvPr/>
         </p:nvPicPr>
         <p:blipFill>
-          <a:blip r:embed="rId2"/>
+          <a:blip r:embed="rId2" cstate="print">
+            <a:extLst>
+              <a:ext uri="{28A0092B-C50C-407E-A947-70E740481C1C}">
+                <a14:useLocalDpi xmlns:a14="http://schemas.microsoft.com/office/drawing/2010/main"/>
+              </a:ext>
+            </a:extLst>
+          </a:blip>
           <a:stretch>
             <a:fillRect/>
           </a:stretch>
@@ -24519,7 +24525,13 @@
           <p:nvPr/>
         </p:nvPicPr>
         <p:blipFill>
-          <a:blip r:embed="rId3"/>
+          <a:blip r:embed="rId3" cstate="print">
+            <a:extLst>
+              <a:ext uri="{28A0092B-C50C-407E-A947-70E740481C1C}">
+                <a14:useLocalDpi xmlns:a14="http://schemas.microsoft.com/office/drawing/2010/main"/>
+              </a:ext>
+            </a:extLst>
+          </a:blip>
           <a:stretch>
             <a:fillRect/>
           </a:stretch>
@@ -25511,7 +25523,7 @@
           <a:blip r:embed="rId2">
             <a:extLst>
               <a:ext uri="{28A0092B-C50C-407E-A947-70E740481C1C}">
-                <a14:useLocalDpi xmlns:a14="http://schemas.microsoft.com/office/drawing/2010/main" val="0"/>
+                <a14:useLocalDpi xmlns:a14="http://schemas.microsoft.com/office/drawing/2010/main"/>
               </a:ext>
             </a:extLst>
           </a:blip>
@@ -25723,7 +25735,7 @@
           <a:blip r:embed="rId2">
             <a:extLst>
               <a:ext uri="{28A0092B-C50C-407E-A947-70E740481C1C}">
-                <a14:useLocalDpi xmlns:a14="http://schemas.microsoft.com/office/drawing/2010/main" val="0"/>
+                <a14:useLocalDpi xmlns:a14="http://schemas.microsoft.com/office/drawing/2010/main"/>
               </a:ext>
             </a:extLst>
           </a:blip>
@@ -27447,7 +27459,7 @@
           <a:blip r:embed="rId2">
             <a:extLst>
               <a:ext uri="{28A0092B-C50C-407E-A947-70E740481C1C}">
-                <a14:useLocalDpi xmlns:a14="http://schemas.microsoft.com/office/drawing/2010/main" val="0"/>
+                <a14:useLocalDpi xmlns:a14="http://schemas.microsoft.com/office/drawing/2010/main"/>
               </a:ext>
             </a:extLst>
           </a:blip>
@@ -27643,7 +27655,7 @@
           <a:blip r:embed="rId2">
             <a:extLst>
               <a:ext uri="{28A0092B-C50C-407E-A947-70E740481C1C}">
-                <a14:useLocalDpi xmlns:a14="http://schemas.microsoft.com/office/drawing/2010/main" val="0"/>
+                <a14:useLocalDpi xmlns:a14="http://schemas.microsoft.com/office/drawing/2010/main"/>
               </a:ext>
             </a:extLst>
           </a:blip>
@@ -27972,7 +27984,7 @@
           <a:blip r:embed="rId2">
             <a:extLst>
               <a:ext uri="{28A0092B-C50C-407E-A947-70E740481C1C}">
-                <a14:useLocalDpi xmlns:a14="http://schemas.microsoft.com/office/drawing/2010/main" val="0"/>
+                <a14:useLocalDpi xmlns:a14="http://schemas.microsoft.com/office/drawing/2010/main"/>
               </a:ext>
             </a:extLst>
           </a:blip>
@@ -28461,8 +28473,14 @@
           <p:nvPr/>
         </p:nvPicPr>
         <p:blipFill rotWithShape="1">
-          <a:blip r:embed="rId3"/>
-          <a:srcRect t="1" b="5531"/>
+          <a:blip r:embed="rId3" cstate="print">
+            <a:extLst>
+              <a:ext uri="{28A0092B-C50C-407E-A947-70E740481C1C}">
+                <a14:useLocalDpi xmlns:a14="http://schemas.microsoft.com/office/drawing/2010/main"/>
+              </a:ext>
+            </a:extLst>
+          </a:blip>
+          <a:srcRect/>
           <a:stretch/>
         </p:blipFill>
         <p:spPr>

</xml_diff>